<commit_message>
Powerpoint has 9 slides!
</commit_message>
<xml_diff>
--- a/Main Folder/presentation.pptx
+++ b/Main Folder/presentation.pptx
@@ -5,10 +5,10 @@
     <p:sldMasterId id="2147483648" r:id="rId4"/>
   </p:sldMasterIdLst>
   <p:notesMasterIdLst>
-    <p:notesMasterId r:id="rId16"/>
+    <p:notesMasterId r:id="rId14"/>
   </p:notesMasterIdLst>
   <p:handoutMasterIdLst>
-    <p:handoutMasterId r:id="rId17"/>
+    <p:handoutMasterId r:id="rId15"/>
   </p:handoutMasterIdLst>
   <p:sldIdLst>
     <p:sldId id="256" r:id="rId5"/>
@@ -20,8 +20,6 @@
     <p:sldId id="260" r:id="rId11"/>
     <p:sldId id="261" r:id="rId12"/>
     <p:sldId id="262" r:id="rId13"/>
-    <p:sldId id="263" r:id="rId14"/>
-    <p:sldId id="267" r:id="rId15"/>
   </p:sldIdLst>
   <p:sldSz cx="12188825" cy="6858000"/>
   <p:notesSz cx="6858000" cy="9144000"/>
@@ -4681,90 +4679,6 @@
 </p:notesMaster>
 </file>
 
-<file path=ppt/notesSlides/notesSlide1.xml><?xml version="1.0" encoding="utf-8"?>
-<p:notes xmlns:a="http://schemas.openxmlformats.org/drawingml/2006/main" xmlns:r="http://schemas.openxmlformats.org/officeDocument/2006/relationships" xmlns:p="http://schemas.openxmlformats.org/presentationml/2006/main">
-  <p:cSld>
-    <p:spTree>
-      <p:nvGrpSpPr>
-        <p:cNvPr id="1" name=""/>
-        <p:cNvGrpSpPr/>
-        <p:nvPr/>
-      </p:nvGrpSpPr>
-      <p:grpSpPr>
-        <a:xfrm>
-          <a:off x="0" y="0"/>
-          <a:ext cx="0" cy="0"/>
-          <a:chOff x="0" y="0"/>
-          <a:chExt cx="0" cy="0"/>
-        </a:xfrm>
-      </p:grpSpPr>
-      <p:sp>
-        <p:nvSpPr>
-          <p:cNvPr id="2" name="Slide Image Placeholder 1"/>
-          <p:cNvSpPr>
-            <a:spLocks noGrp="1" noRot="1" noChangeAspect="1"/>
-          </p:cNvSpPr>
-          <p:nvPr>
-            <p:ph type="sldImg"/>
-          </p:nvPr>
-        </p:nvSpPr>
-        <p:spPr/>
-      </p:sp>
-      <p:sp>
-        <p:nvSpPr>
-          <p:cNvPr id="3" name="Notes Placeholder 2"/>
-          <p:cNvSpPr>
-            <a:spLocks noGrp="1"/>
-          </p:cNvSpPr>
-          <p:nvPr>
-            <p:ph type="body" idx="1"/>
-          </p:nvPr>
-        </p:nvSpPr>
-        <p:spPr/>
-        <p:txBody>
-          <a:bodyPr/>
-          <a:lstStyle/>
-          <a:p>
-            <a:endParaRPr lang="en-US" dirty="0"/>
-          </a:p>
-        </p:txBody>
-      </p:sp>
-      <p:sp>
-        <p:nvSpPr>
-          <p:cNvPr id="4" name="Slide Number Placeholder 3"/>
-          <p:cNvSpPr>
-            <a:spLocks noGrp="1"/>
-          </p:cNvSpPr>
-          <p:nvPr>
-            <p:ph type="sldNum" sz="quarter" idx="10"/>
-          </p:nvPr>
-        </p:nvSpPr>
-        <p:spPr/>
-        <p:txBody>
-          <a:bodyPr/>
-          <a:lstStyle/>
-          <a:p>
-            <a:fld id="{B045B7DE-1198-4F2F-B574-CA8CAE341642}" type="slidenum">
-              <a:rPr lang="en-US" smtClean="0"/>
-              <a:t>11</a:t>
-            </a:fld>
-            <a:endParaRPr lang="en-US"/>
-          </a:p>
-        </p:txBody>
-      </p:sp>
-    </p:spTree>
-    <p:extLst>
-      <p:ext uri="{BB962C8B-B14F-4D97-AF65-F5344CB8AC3E}">
-        <p14:creationId xmlns:p14="http://schemas.microsoft.com/office/powerpoint/2010/main" val="2959738056"/>
-      </p:ext>
-    </p:extLst>
-  </p:cSld>
-  <p:clrMapOvr>
-    <a:masterClrMapping/>
-  </p:clrMapOvr>
-</p:notes>
-</file>
-
 <file path=ppt/slideLayouts/slideLayout1.xml><?xml version="1.0" encoding="utf-8"?>
 <p:sldLayout xmlns:a="http://schemas.openxmlformats.org/drawingml/2006/main" xmlns:r="http://schemas.openxmlformats.org/officeDocument/2006/relationships" xmlns:p="http://schemas.openxmlformats.org/presentationml/2006/main" showMasterSp="0" type="title" preserve="1">
   <p:cSld name="Title Slide">
@@ -9548,205 +9462,6 @@
     <p:extLst>
       <p:ext uri="{BB962C8B-B14F-4D97-AF65-F5344CB8AC3E}">
         <p14:creationId xmlns:p14="http://schemas.microsoft.com/office/powerpoint/2010/main" val="2801835050"/>
-      </p:ext>
-    </p:extLst>
-  </p:cSld>
-  <p:clrMapOvr>
-    <a:masterClrMapping/>
-  </p:clrMapOvr>
-  <mc:AlternateContent xmlns:mc="http://schemas.openxmlformats.org/markup-compatibility/2006" xmlns:p14="http://schemas.microsoft.com/office/powerpoint/2010/main">
-    <mc:Choice Requires="p14">
-      <p:transition spd="med" p14:dur="700">
-        <p:fade/>
-      </p:transition>
-    </mc:Choice>
-    <mc:Fallback xmlns="">
-      <p:transition spd="med">
-        <p:fade/>
-      </p:transition>
-    </mc:Fallback>
-  </mc:AlternateContent>
-</p:sld>
-</file>
-
-<file path=ppt/slides/slide10.xml><?xml version="1.0" encoding="utf-8"?>
-<p:sld xmlns:a="http://schemas.openxmlformats.org/drawingml/2006/main" xmlns:r="http://schemas.openxmlformats.org/officeDocument/2006/relationships" xmlns:p="http://schemas.openxmlformats.org/presentationml/2006/main">
-  <p:cSld>
-    <p:spTree>
-      <p:nvGrpSpPr>
-        <p:cNvPr id="1" name=""/>
-        <p:cNvGrpSpPr/>
-        <p:nvPr/>
-      </p:nvGrpSpPr>
-      <p:grpSpPr>
-        <a:xfrm>
-          <a:off x="0" y="0"/>
-          <a:ext cx="0" cy="0"/>
-          <a:chOff x="0" y="0"/>
-          <a:chExt cx="0" cy="0"/>
-        </a:xfrm>
-      </p:grpSpPr>
-      <p:sp>
-        <p:nvSpPr>
-          <p:cNvPr id="2" name="Title 1"/>
-          <p:cNvSpPr>
-            <a:spLocks noGrp="1"/>
-          </p:cNvSpPr>
-          <p:nvPr>
-            <p:ph type="title"/>
-          </p:nvPr>
-        </p:nvSpPr>
-        <p:spPr/>
-        <p:txBody>
-          <a:bodyPr/>
-          <a:lstStyle/>
-          <a:p>
-            <a:r>
-              <a:rPr lang="en-US" dirty="0"/>
-              <a:t>Add a Slide Title - 4</a:t>
-            </a:r>
-          </a:p>
-        </p:txBody>
-      </p:sp>
-      <p:sp>
-        <p:nvSpPr>
-          <p:cNvPr id="3" name="Content Placeholder 2"/>
-          <p:cNvSpPr>
-            <a:spLocks noGrp="1"/>
-          </p:cNvSpPr>
-          <p:nvPr>
-            <p:ph idx="1"/>
-          </p:nvPr>
-        </p:nvSpPr>
-        <p:spPr/>
-        <p:txBody>
-          <a:bodyPr/>
-          <a:lstStyle/>
-          <a:p>
-            <a:endParaRPr lang="en-US" dirty="0"/>
-          </a:p>
-        </p:txBody>
-      </p:sp>
-      <p:sp>
-        <p:nvSpPr>
-          <p:cNvPr id="4" name="Text Placeholder 3"/>
-          <p:cNvSpPr>
-            <a:spLocks noGrp="1"/>
-          </p:cNvSpPr>
-          <p:nvPr>
-            <p:ph type="body" sz="half" idx="2"/>
-          </p:nvPr>
-        </p:nvSpPr>
-        <p:spPr/>
-        <p:txBody>
-          <a:bodyPr/>
-          <a:lstStyle/>
-          <a:p>
-            <a:endParaRPr lang="en-US" dirty="0"/>
-          </a:p>
-        </p:txBody>
-      </p:sp>
-    </p:spTree>
-    <p:extLst>
-      <p:ext uri="{BB962C8B-B14F-4D97-AF65-F5344CB8AC3E}">
-        <p14:creationId xmlns:p14="http://schemas.microsoft.com/office/powerpoint/2010/main" val="182260020"/>
-      </p:ext>
-    </p:extLst>
-  </p:cSld>
-  <p:clrMapOvr>
-    <a:masterClrMapping/>
-  </p:clrMapOvr>
-  <mc:AlternateContent xmlns:mc="http://schemas.openxmlformats.org/markup-compatibility/2006" xmlns:p14="http://schemas.microsoft.com/office/powerpoint/2010/main">
-    <mc:Choice Requires="p14">
-      <p:transition spd="med" p14:dur="700">
-        <p:fade/>
-      </p:transition>
-    </mc:Choice>
-    <mc:Fallback xmlns="">
-      <p:transition spd="med">
-        <p:fade/>
-      </p:transition>
-    </mc:Fallback>
-  </mc:AlternateContent>
-</p:sld>
-</file>
-
-<file path=ppt/slides/slide11.xml><?xml version="1.0" encoding="utf-8"?>
-<p:sld xmlns:a="http://schemas.openxmlformats.org/drawingml/2006/main" xmlns:r="http://schemas.openxmlformats.org/officeDocument/2006/relationships" xmlns:p="http://schemas.openxmlformats.org/presentationml/2006/main">
-  <p:cSld>
-    <p:spTree>
-      <p:nvGrpSpPr>
-        <p:cNvPr id="1" name=""/>
-        <p:cNvGrpSpPr/>
-        <p:nvPr/>
-      </p:nvGrpSpPr>
-      <p:grpSpPr>
-        <a:xfrm>
-          <a:off x="0" y="0"/>
-          <a:ext cx="0" cy="0"/>
-          <a:chOff x="0" y="0"/>
-          <a:chExt cx="0" cy="0"/>
-        </a:xfrm>
-      </p:grpSpPr>
-      <p:sp>
-        <p:nvSpPr>
-          <p:cNvPr id="2" name="Title 1"/>
-          <p:cNvSpPr>
-            <a:spLocks noGrp="1"/>
-          </p:cNvSpPr>
-          <p:nvPr>
-            <p:ph type="title"/>
-          </p:nvPr>
-        </p:nvSpPr>
-        <p:spPr/>
-        <p:txBody>
-          <a:bodyPr/>
-          <a:lstStyle/>
-          <a:p>
-            <a:r>
-              <a:rPr lang="en-US" dirty="0"/>
-              <a:t>Add a Slide Title - 5</a:t>
-            </a:r>
-          </a:p>
-        </p:txBody>
-      </p:sp>
-      <p:sp>
-        <p:nvSpPr>
-          <p:cNvPr id="6" name="Picture Placeholder 5" descr="An empty placeholder to add an image. Click on the placeholder and select the image that you wish to add"/>
-          <p:cNvSpPr>
-            <a:spLocks noGrp="1"/>
-          </p:cNvSpPr>
-          <p:nvPr>
-            <p:ph type="pic" idx="1"/>
-          </p:nvPr>
-        </p:nvSpPr>
-        <p:spPr/>
-      </p:sp>
-      <p:sp>
-        <p:nvSpPr>
-          <p:cNvPr id="4" name="Text Placeholder 3"/>
-          <p:cNvSpPr>
-            <a:spLocks noGrp="1"/>
-          </p:cNvSpPr>
-          <p:nvPr>
-            <p:ph type="body" sz="half" idx="2"/>
-          </p:nvPr>
-        </p:nvSpPr>
-        <p:spPr/>
-        <p:txBody>
-          <a:bodyPr>
-            <a:normAutofit/>
-          </a:bodyPr>
-          <a:lstStyle/>
-          <a:p>
-            <a:endParaRPr lang="en-US" dirty="0"/>
-          </a:p>
-        </p:txBody>
-      </p:sp>
-    </p:spTree>
-    <p:extLst>
-      <p:ext uri="{BB962C8B-B14F-4D97-AF65-F5344CB8AC3E}">
-        <p14:creationId xmlns:p14="http://schemas.microsoft.com/office/powerpoint/2010/main" val="1544840953"/>
       </p:ext>
     </p:extLst>
   </p:cSld>
@@ -11445,6 +11160,15 @@
 </file>
 
 <file path=customXml/item1.xml><?xml version="1.0" encoding="utf-8"?>
+<?mso-contentType ?>
+<FormTemplates xmlns="http://schemas.microsoft.com/sharepoint/v3/contenttype/forms">
+  <Display>DocumentLibraryForm</Display>
+  <Edit>DocumentLibraryForm</Edit>
+  <New>DocumentLibraryForm</New>
+</FormTemplates>
+</file>
+
+<file path=customXml/item2.xml><?xml version="1.0" encoding="utf-8"?>
 <ct:contentTypeSchema xmlns:ct="http://schemas.microsoft.com/office/2006/metadata/contentType" xmlns:ma="http://schemas.microsoft.com/office/2006/metadata/properties/metaAttributes" ct:_="" ma:_="" ma:contentTypeName="Document" ma:contentTypeID="0x010100AA3F7D94069FF64A86F7DFF56D60E3BE" ma:contentTypeVersion="6" ma:contentTypeDescription="Create a new document." ma:contentTypeScope="" ma:versionID="c32302c77d4085ecf495bdddb7f5e889">
   <xsd:schema xmlns:xsd="http://www.w3.org/2001/XMLSchema" xmlns:xs="http://www.w3.org/2001/XMLSchema" xmlns:p="http://schemas.microsoft.com/office/2006/metadata/properties" xmlns:ns2="a4f35948-e619-41b3-aa29-22878b09cfd2" xmlns:ns3="40262f94-9f35-4ac3-9a90-690165a166b7" targetNamespace="http://schemas.microsoft.com/office/2006/metadata/properties" ma:root="true" ma:fieldsID="4ab5ae46be95f9d0be6107e8200be7a2" ns2:_="" ns3:_="">
     <xsd:import namespace="a4f35948-e619-41b3-aa29-22878b09cfd2"/>
@@ -11625,15 +11349,6 @@
 </ct:contentTypeSchema>
 </file>
 
-<file path=customXml/item2.xml><?xml version="1.0" encoding="utf-8"?>
-<?mso-contentType ?>
-<FormTemplates xmlns="http://schemas.microsoft.com/sharepoint/v3/contenttype/forms">
-  <Display>DocumentLibraryForm</Display>
-  <Edit>DocumentLibraryForm</Edit>
-  <New>DocumentLibraryForm</New>
-</FormTemplates>
-</file>
-
 <file path=customXml/item3.xml><?xml version="1.0" encoding="utf-8"?>
 <p:properties xmlns:p="http://schemas.microsoft.com/office/2006/metadata/properties" xmlns:xsi="http://www.w3.org/2001/XMLSchema-instance" xmlns:pc="http://schemas.microsoft.com/office/infopath/2007/PartnerControls">
   <documentManagement>
@@ -11646,6 +11361,14 @@
 </file>
 
 <file path=customXml/itemProps1.xml><?xml version="1.0" encoding="utf-8"?>
+<ds:datastoreItem xmlns:ds="http://schemas.openxmlformats.org/officeDocument/2006/customXml" ds:itemID="{308942AA-0721-4324-BC2C-A3CB43F24E71}">
+  <ds:schemaRefs>
+    <ds:schemaRef ds:uri="http://schemas.microsoft.com/sharepoint/v3/contenttype/forms"/>
+  </ds:schemaRefs>
+</ds:datastoreItem>
+</file>
+
+<file path=customXml/itemProps2.xml><?xml version="1.0" encoding="utf-8"?>
 <ds:datastoreItem xmlns:ds="http://schemas.openxmlformats.org/officeDocument/2006/customXml" ds:itemID="{FB14945D-DABB-422F-9B28-D299995C9226}">
   <ds:schemaRefs>
     <ds:schemaRef ds:uri="http://schemas.microsoft.com/office/2006/metadata/contentType"/>
@@ -11660,14 +11383,6 @@
     <ds:schemaRef ds:uri="http://purl.org/dc/elements/1.1/"/>
     <ds:schemaRef ds:uri="http://purl.org/dc/terms/"/>
     <ds:schemaRef ds:uri="http://schemas.microsoft.com/internal/obd"/>
-  </ds:schemaRefs>
-</ds:datastoreItem>
-</file>
-
-<file path=customXml/itemProps2.xml><?xml version="1.0" encoding="utf-8"?>
-<ds:datastoreItem xmlns:ds="http://schemas.openxmlformats.org/officeDocument/2006/customXml" ds:itemID="{308942AA-0721-4324-BC2C-A3CB43F24E71}">
-  <ds:schemaRefs>
-    <ds:schemaRef ds:uri="http://schemas.microsoft.com/sharepoint/v3/contenttype/forms"/>
   </ds:schemaRefs>
 </ds:datastoreItem>
 </file>

</xml_diff>

<commit_message>
Finished 1st slide, prelimary on 2nd slide
</commit_message>
<xml_diff>
--- a/Main Folder/presentation.pptx
+++ b/Main Folder/presentation.pptx
@@ -4679,6 +4679,98 @@
 </p:notesMaster>
 </file>
 
+<file path=ppt/notesSlides/notesSlide1.xml><?xml version="1.0" encoding="utf-8"?>
+<p:notes xmlns:a="http://schemas.openxmlformats.org/drawingml/2006/main" xmlns:r="http://schemas.openxmlformats.org/officeDocument/2006/relationships" xmlns:p="http://schemas.openxmlformats.org/presentationml/2006/main">
+  <p:cSld>
+    <p:spTree>
+      <p:nvGrpSpPr>
+        <p:cNvPr id="1" name=""/>
+        <p:cNvGrpSpPr/>
+        <p:nvPr/>
+      </p:nvGrpSpPr>
+      <p:grpSpPr>
+        <a:xfrm>
+          <a:off x="0" y="0"/>
+          <a:ext cx="0" cy="0"/>
+          <a:chOff x="0" y="0"/>
+          <a:chExt cx="0" cy="0"/>
+        </a:xfrm>
+      </p:grpSpPr>
+      <p:sp>
+        <p:nvSpPr>
+          <p:cNvPr id="2" name="Slide Image Placeholder 1"/>
+          <p:cNvSpPr>
+            <a:spLocks noGrp="1" noRot="1" noChangeAspect="1"/>
+          </p:cNvSpPr>
+          <p:nvPr>
+            <p:ph type="sldImg"/>
+          </p:nvPr>
+        </p:nvSpPr>
+        <p:spPr/>
+      </p:sp>
+      <p:sp>
+        <p:nvSpPr>
+          <p:cNvPr id="3" name="Notes Placeholder 2"/>
+          <p:cNvSpPr>
+            <a:spLocks noGrp="1"/>
+          </p:cNvSpPr>
+          <p:nvPr>
+            <p:ph type="body" idx="1"/>
+          </p:nvPr>
+        </p:nvSpPr>
+        <p:spPr/>
+        <p:txBody>
+          <a:bodyPr/>
+          <a:lstStyle/>
+          <a:p>
+            <a:r>
+              <a:rPr lang="en-US" dirty="0" smtClean="0"/>
+              <a:t>Hello everyone, we are group 4, and Our project idea is to make</a:t>
+            </a:r>
+            <a:r>
+              <a:rPr lang="en-US" baseline="0" dirty="0" smtClean="0"/>
+              <a:t> a back-end for a restaurant ordering system.  Now, a back-end ordering system is the process of the restaurant making an order to a supplier, who then delivers the order to the restaurant after some amount of time.  The exacts of this operation can vary, but generally it follows that rule.  So we have decided to make a system to assist and streamline this procedure.</a:t>
+            </a:r>
+            <a:endParaRPr lang="en-US" dirty="0"/>
+          </a:p>
+        </p:txBody>
+      </p:sp>
+      <p:sp>
+        <p:nvSpPr>
+          <p:cNvPr id="4" name="Slide Number Placeholder 3"/>
+          <p:cNvSpPr>
+            <a:spLocks noGrp="1"/>
+          </p:cNvSpPr>
+          <p:nvPr>
+            <p:ph type="sldNum" sz="quarter" idx="10"/>
+          </p:nvPr>
+        </p:nvSpPr>
+        <p:spPr/>
+        <p:txBody>
+          <a:bodyPr/>
+          <a:lstStyle/>
+          <a:p>
+            <a:fld id="{B045B7DE-1198-4F2F-B574-CA8CAE341642}" type="slidenum">
+              <a:rPr lang="en-US" smtClean="0"/>
+              <a:t>1</a:t>
+            </a:fld>
+            <a:endParaRPr lang="en-US"/>
+          </a:p>
+        </p:txBody>
+      </p:sp>
+    </p:spTree>
+    <p:extLst>
+      <p:ext uri="{BB962C8B-B14F-4D97-AF65-F5344CB8AC3E}">
+        <p14:creationId xmlns:p14="http://schemas.microsoft.com/office/powerpoint/2010/main" val="2750943625"/>
+      </p:ext>
+    </p:extLst>
+  </p:cSld>
+  <p:clrMapOvr>
+    <a:masterClrMapping/>
+  </p:clrMapOvr>
+</p:notes>
+</file>
+
 <file path=ppt/slideLayouts/slideLayout1.xml><?xml version="1.0" encoding="utf-8"?>
 <p:sldLayout xmlns:a="http://schemas.openxmlformats.org/drawingml/2006/main" xmlns:r="http://schemas.openxmlformats.org/officeDocument/2006/relationships" xmlns:p="http://schemas.openxmlformats.org/presentationml/2006/main" showMasterSp="0" type="title" preserve="1">
   <p:cSld name="Title Slide">
@@ -9430,9 +9522,10 @@
           <a:lstStyle/>
           <a:p>
             <a:r>
-              <a:rPr lang="en-US" dirty="0"/>
-              <a:t>Title Layout</a:t>
+              <a:rPr lang="en-US" dirty="0" smtClean="0"/>
+              <a:t>Restaurant Ordering System</a:t>
             </a:r>
+            <a:endParaRPr lang="en-US" dirty="0"/>
           </a:p>
         </p:txBody>
       </p:sp>
@@ -9452,9 +9545,259 @@
           <a:lstStyle/>
           <a:p>
             <a:r>
-              <a:rPr lang="en-US" dirty="0"/>
-              <a:t>Subtitle</a:t>
+              <a:rPr lang="en-US" dirty="0" smtClean="0"/>
+              <a:t>A simple solution to common problems</a:t>
             </a:r>
+            <a:endParaRPr lang="en-US" dirty="0"/>
+          </a:p>
+        </p:txBody>
+      </p:sp>
+      <p:sp>
+        <p:nvSpPr>
+          <p:cNvPr id="4" name="Subtitle 2"/>
+          <p:cNvSpPr txBox="1">
+            <a:spLocks/>
+          </p:cNvSpPr>
+          <p:nvPr/>
+        </p:nvSpPr>
+        <p:spPr>
+          <a:xfrm>
+            <a:off x="-29891" y="6553200"/>
+            <a:ext cx="9141619" cy="747972"/>
+          </a:xfrm>
+          <a:prstGeom prst="rect">
+            <a:avLst/>
+          </a:prstGeom>
+        </p:spPr>
+        <p:txBody>
+          <a:bodyPr vert="horz" lIns="121899" tIns="60949" rIns="121899" bIns="60949" rtlCol="0">
+            <a:normAutofit/>
+          </a:bodyPr>
+          <a:lstStyle>
+            <a:lvl1pPr marL="0" indent="0" algn="l" defTabSz="1218987" rtl="0" eaLnBrk="1" latinLnBrk="0" hangingPunct="1">
+              <a:lnSpc>
+                <a:spcPct val="90000"/>
+              </a:lnSpc>
+              <a:spcBef>
+                <a:spcPts val="1800"/>
+              </a:spcBef>
+              <a:buClr>
+                <a:schemeClr val="accent1">
+                  <a:lumMod val="75000"/>
+                </a:schemeClr>
+              </a:buClr>
+              <a:buFont typeface="Arial" pitchFamily="34" charset="0"/>
+              <a:buNone/>
+              <a:defRPr sz="2800" kern="1200">
+                <a:solidFill>
+                  <a:schemeClr val="accent1">
+                    <a:lumMod val="75000"/>
+                  </a:schemeClr>
+                </a:solidFill>
+                <a:latin typeface="+mn-lt"/>
+                <a:ea typeface="+mn-ea"/>
+                <a:cs typeface="+mn-cs"/>
+              </a:defRPr>
+            </a:lvl1pPr>
+            <a:lvl2pPr marL="609493" indent="0" algn="ctr" defTabSz="1218987" rtl="0" eaLnBrk="1" latinLnBrk="0" hangingPunct="1">
+              <a:lnSpc>
+                <a:spcPct val="90000"/>
+              </a:lnSpc>
+              <a:spcBef>
+                <a:spcPts val="1200"/>
+              </a:spcBef>
+              <a:buClr>
+                <a:schemeClr val="accent1">
+                  <a:lumMod val="75000"/>
+                </a:schemeClr>
+              </a:buClr>
+              <a:buFont typeface="Arial" pitchFamily="34" charset="0"/>
+              <a:buNone/>
+              <a:defRPr sz="2400" kern="1200">
+                <a:solidFill>
+                  <a:schemeClr val="tx1">
+                    <a:tint val="75000"/>
+                  </a:schemeClr>
+                </a:solidFill>
+                <a:latin typeface="+mn-lt"/>
+                <a:ea typeface="+mn-ea"/>
+                <a:cs typeface="+mn-cs"/>
+              </a:defRPr>
+            </a:lvl2pPr>
+            <a:lvl3pPr marL="1218987" indent="0" algn="ctr" defTabSz="1218987" rtl="0" eaLnBrk="1" latinLnBrk="0" hangingPunct="1">
+              <a:lnSpc>
+                <a:spcPct val="90000"/>
+              </a:lnSpc>
+              <a:spcBef>
+                <a:spcPts val="800"/>
+              </a:spcBef>
+              <a:buClr>
+                <a:schemeClr val="accent1">
+                  <a:lumMod val="75000"/>
+                </a:schemeClr>
+              </a:buClr>
+              <a:buFont typeface="Arial" pitchFamily="34" charset="0"/>
+              <a:buNone/>
+              <a:defRPr sz="2000" kern="1200">
+                <a:solidFill>
+                  <a:schemeClr val="tx1">
+                    <a:tint val="75000"/>
+                  </a:schemeClr>
+                </a:solidFill>
+                <a:latin typeface="+mn-lt"/>
+                <a:ea typeface="+mn-ea"/>
+                <a:cs typeface="+mn-cs"/>
+              </a:defRPr>
+            </a:lvl3pPr>
+            <a:lvl4pPr marL="1828480" indent="0" algn="ctr" defTabSz="1218987" rtl="0" eaLnBrk="1" latinLnBrk="0" hangingPunct="1">
+              <a:lnSpc>
+                <a:spcPct val="90000"/>
+              </a:lnSpc>
+              <a:spcBef>
+                <a:spcPts val="800"/>
+              </a:spcBef>
+              <a:buClr>
+                <a:schemeClr val="accent1">
+                  <a:lumMod val="75000"/>
+                </a:schemeClr>
+              </a:buClr>
+              <a:buFont typeface="Arial" pitchFamily="34" charset="0"/>
+              <a:buNone/>
+              <a:defRPr sz="2000" kern="1200">
+                <a:solidFill>
+                  <a:schemeClr val="tx1">
+                    <a:tint val="75000"/>
+                  </a:schemeClr>
+                </a:solidFill>
+                <a:latin typeface="+mn-lt"/>
+                <a:ea typeface="+mn-ea"/>
+                <a:cs typeface="+mn-cs"/>
+              </a:defRPr>
+            </a:lvl4pPr>
+            <a:lvl5pPr marL="2437973" indent="0" algn="ctr" defTabSz="1218987" rtl="0" eaLnBrk="1" latinLnBrk="0" hangingPunct="1">
+              <a:lnSpc>
+                <a:spcPct val="90000"/>
+              </a:lnSpc>
+              <a:spcBef>
+                <a:spcPts val="800"/>
+              </a:spcBef>
+              <a:buClr>
+                <a:schemeClr val="accent1">
+                  <a:lumMod val="75000"/>
+                </a:schemeClr>
+              </a:buClr>
+              <a:buFont typeface="Arial" pitchFamily="34" charset="0"/>
+              <a:buNone/>
+              <a:defRPr sz="2000" kern="1200">
+                <a:solidFill>
+                  <a:schemeClr val="tx1">
+                    <a:tint val="75000"/>
+                  </a:schemeClr>
+                </a:solidFill>
+                <a:latin typeface="+mn-lt"/>
+                <a:ea typeface="+mn-ea"/>
+                <a:cs typeface="+mn-cs"/>
+              </a:defRPr>
+            </a:lvl5pPr>
+            <a:lvl6pPr marL="3047467" indent="0" algn="ctr" defTabSz="1218987" rtl="0" eaLnBrk="1" latinLnBrk="0" hangingPunct="1">
+              <a:lnSpc>
+                <a:spcPct val="90000"/>
+              </a:lnSpc>
+              <a:spcBef>
+                <a:spcPts val="800"/>
+              </a:spcBef>
+              <a:buClr>
+                <a:schemeClr val="accent1"/>
+              </a:buClr>
+              <a:buFont typeface="Arial" pitchFamily="34" charset="0"/>
+              <a:buNone/>
+              <a:defRPr sz="2000" kern="1200" baseline="0">
+                <a:solidFill>
+                  <a:schemeClr val="tx1">
+                    <a:tint val="75000"/>
+                  </a:schemeClr>
+                </a:solidFill>
+                <a:latin typeface="+mn-lt"/>
+                <a:ea typeface="+mn-ea"/>
+                <a:cs typeface="+mn-cs"/>
+              </a:defRPr>
+            </a:lvl6pPr>
+            <a:lvl7pPr marL="3656960" indent="0" algn="ctr" defTabSz="1218987" rtl="0" eaLnBrk="1" latinLnBrk="0" hangingPunct="1">
+              <a:lnSpc>
+                <a:spcPct val="90000"/>
+              </a:lnSpc>
+              <a:spcBef>
+                <a:spcPts val="800"/>
+              </a:spcBef>
+              <a:buClr>
+                <a:schemeClr val="accent1"/>
+              </a:buClr>
+              <a:buFont typeface="Arial" pitchFamily="34" charset="0"/>
+              <a:buNone/>
+              <a:defRPr sz="2000" kern="1200" baseline="0">
+                <a:solidFill>
+                  <a:schemeClr val="tx1">
+                    <a:tint val="75000"/>
+                  </a:schemeClr>
+                </a:solidFill>
+                <a:latin typeface="+mn-lt"/>
+                <a:ea typeface="+mn-ea"/>
+                <a:cs typeface="+mn-cs"/>
+              </a:defRPr>
+            </a:lvl7pPr>
+            <a:lvl8pPr marL="4266453" indent="0" algn="ctr" defTabSz="1218987" rtl="0" eaLnBrk="1" latinLnBrk="0" hangingPunct="1">
+              <a:lnSpc>
+                <a:spcPct val="90000"/>
+              </a:lnSpc>
+              <a:spcBef>
+                <a:spcPts val="800"/>
+              </a:spcBef>
+              <a:buClr>
+                <a:schemeClr val="accent1"/>
+              </a:buClr>
+              <a:buFont typeface="Arial" pitchFamily="34" charset="0"/>
+              <a:buNone/>
+              <a:defRPr sz="2000" kern="1200" baseline="0">
+                <a:solidFill>
+                  <a:schemeClr val="tx1">
+                    <a:tint val="75000"/>
+                  </a:schemeClr>
+                </a:solidFill>
+                <a:latin typeface="+mn-lt"/>
+                <a:ea typeface="+mn-ea"/>
+                <a:cs typeface="+mn-cs"/>
+              </a:defRPr>
+            </a:lvl8pPr>
+            <a:lvl9pPr marL="4875947" indent="0" algn="ctr" defTabSz="1218987" rtl="0" eaLnBrk="1" latinLnBrk="0" hangingPunct="1">
+              <a:lnSpc>
+                <a:spcPct val="90000"/>
+              </a:lnSpc>
+              <a:spcBef>
+                <a:spcPts val="800"/>
+              </a:spcBef>
+              <a:buClr>
+                <a:schemeClr val="accent1"/>
+              </a:buClr>
+              <a:buFont typeface="Arial" pitchFamily="34" charset="0"/>
+              <a:buNone/>
+              <a:defRPr sz="2000" kern="1200" baseline="0">
+                <a:solidFill>
+                  <a:schemeClr val="tx1">
+                    <a:tint val="75000"/>
+                  </a:schemeClr>
+                </a:solidFill>
+                <a:latin typeface="+mn-lt"/>
+                <a:ea typeface="+mn-ea"/>
+                <a:cs typeface="+mn-cs"/>
+              </a:defRPr>
+            </a:lvl9pPr>
+          </a:lstStyle>
+          <a:p>
+            <a:r>
+              <a:rPr lang="en-US" sz="1600" dirty="0" smtClean="0"/>
+              <a:t>Presented by Calder, Xenon, Nguyen, Shawn</a:t>
+            </a:r>
+            <a:endParaRPr lang="en-US" sz="1600" dirty="0"/>
           </a:p>
         </p:txBody>
       </p:sp>
@@ -9510,15 +9853,23 @@
             <p:ph type="title"/>
           </p:nvPr>
         </p:nvSpPr>
-        <p:spPr/>
+        <p:spPr>
+          <a:xfrm>
+            <a:off x="1598612" y="152400"/>
+            <a:ext cx="9371330" cy="685800"/>
+          </a:xfrm>
+        </p:spPr>
         <p:txBody>
-          <a:bodyPr/>
+          <a:bodyPr>
+            <a:normAutofit/>
+          </a:bodyPr>
           <a:lstStyle/>
           <a:p>
             <a:r>
-              <a:rPr lang="en-US" dirty="0"/>
-              <a:t>Title and Content Layout with List</a:t>
+              <a:rPr lang="en-US" dirty="0" smtClean="0"/>
+              <a:t>What is the system, and how does it do it?</a:t>
             </a:r>
+            <a:endParaRPr lang="en-US" dirty="0"/>
           </a:p>
         </p:txBody>
       </p:sp>
@@ -9532,27 +9883,42 @@
             <p:ph idx="1"/>
           </p:nvPr>
         </p:nvSpPr>
-        <p:spPr/>
+        <p:spPr>
+          <a:xfrm>
+            <a:off x="1218883" y="1639389"/>
+            <a:ext cx="9751060" cy="4572000"/>
+          </a:xfrm>
+        </p:spPr>
         <p:txBody>
           <a:bodyPr/>
           <a:lstStyle/>
           <a:p>
             <a:r>
-              <a:rPr lang="en-US" dirty="0"/>
-              <a:t>Add your first bullet point here</a:t>
+              <a:rPr lang="en-US" dirty="0" smtClean="0"/>
+              <a:t>What is the objective of the system?</a:t>
             </a:r>
           </a:p>
           <a:p>
             <a:r>
-              <a:rPr lang="en-US" dirty="0"/>
-              <a:t>Add your second bullet point here</a:t>
+              <a:rPr lang="en-US" dirty="0" smtClean="0"/>
+              <a:t>How does the system allow you to complete the objective?</a:t>
             </a:r>
           </a:p>
           <a:p>
+            <a:endParaRPr lang="en-US" dirty="0"/>
+          </a:p>
+          <a:p>
             <a:r>
-              <a:rPr lang="en-US" dirty="0"/>
-              <a:t>Add your third bullet point here</a:t>
+              <a:rPr lang="en-US" dirty="0" smtClean="0"/>
+              <a:t>To let people order inventory items through the use of a computer with an online connection</a:t>
             </a:r>
+          </a:p>
+          <a:p>
+            <a:r>
+              <a:rPr lang="en-US" dirty="0" smtClean="0"/>
+              <a:t>Through a website that is connected to the supplier, the user can use various forms to add and remove items in an order and have that order be automatically sent to the supplier</a:t>
+            </a:r>
+            <a:endParaRPr lang="en-US" dirty="0" smtClean="0"/>
           </a:p>
         </p:txBody>
       </p:sp>
@@ -11160,12 +11526,14 @@
 </file>
 
 <file path=customXml/item1.xml><?xml version="1.0" encoding="utf-8"?>
-<?mso-contentType ?>
-<FormTemplates xmlns="http://schemas.microsoft.com/sharepoint/v3/contenttype/forms">
-  <Display>DocumentLibraryForm</Display>
-  <Edit>DocumentLibraryForm</Edit>
-  <New>DocumentLibraryForm</New>
-</FormTemplates>
+<p:properties xmlns:p="http://schemas.microsoft.com/office/2006/metadata/properties" xmlns:xsi="http://www.w3.org/2001/XMLSchema-instance" xmlns:pc="http://schemas.microsoft.com/office/infopath/2007/PartnerControls">
+  <documentManagement>
+    <VSO_x0020_item_x0020_id xmlns="40262f94-9f35-4ac3-9a90-690165a166b7" xsi:nil="true"/>
+    <Assetid_x0020_ xmlns="40262f94-9f35-4ac3-9a90-690165a166b7" xsi:nil="true"/>
+    <Item_x0020_Details xmlns="40262f94-9f35-4ac3-9a90-690165a166b7" xsi:nil="true"/>
+    <Template_x0020_details xmlns="40262f94-9f35-4ac3-9a90-690165a166b7" xsi:nil="true"/>
+  </documentManagement>
+</p:properties>
 </file>
 
 <file path=customXml/item2.xml><?xml version="1.0" encoding="utf-8"?>
@@ -11350,20 +11718,27 @@
 </file>
 
 <file path=customXml/item3.xml><?xml version="1.0" encoding="utf-8"?>
-<p:properties xmlns:p="http://schemas.microsoft.com/office/2006/metadata/properties" xmlns:xsi="http://www.w3.org/2001/XMLSchema-instance" xmlns:pc="http://schemas.microsoft.com/office/infopath/2007/PartnerControls">
-  <documentManagement>
-    <VSO_x0020_item_x0020_id xmlns="40262f94-9f35-4ac3-9a90-690165a166b7" xsi:nil="true"/>
-    <Assetid_x0020_ xmlns="40262f94-9f35-4ac3-9a90-690165a166b7" xsi:nil="true"/>
-    <Item_x0020_Details xmlns="40262f94-9f35-4ac3-9a90-690165a166b7" xsi:nil="true"/>
-    <Template_x0020_details xmlns="40262f94-9f35-4ac3-9a90-690165a166b7" xsi:nil="true"/>
-  </documentManagement>
-</p:properties>
+<?mso-contentType ?>
+<FormTemplates xmlns="http://schemas.microsoft.com/sharepoint/v3/contenttype/forms">
+  <Display>DocumentLibraryForm</Display>
+  <Edit>DocumentLibraryForm</Edit>
+  <New>DocumentLibraryForm</New>
+</FormTemplates>
 </file>
 
 <file path=customXml/itemProps1.xml><?xml version="1.0" encoding="utf-8"?>
-<ds:datastoreItem xmlns:ds="http://schemas.openxmlformats.org/officeDocument/2006/customXml" ds:itemID="{308942AA-0721-4324-BC2C-A3CB43F24E71}">
+<ds:datastoreItem xmlns:ds="http://schemas.openxmlformats.org/officeDocument/2006/customXml" ds:itemID="{5E700CCB-20BA-4760-AB9F-AC3B63ED32E0}">
   <ds:schemaRefs>
-    <ds:schemaRef ds:uri="http://schemas.microsoft.com/sharepoint/v3/contenttype/forms"/>
+    <ds:schemaRef ds:uri="http://purl.org/dc/terms/"/>
+    <ds:schemaRef ds:uri="http://schemas.openxmlformats.org/package/2006/metadata/core-properties"/>
+    <ds:schemaRef ds:uri="http://schemas.microsoft.com/office/2006/documentManagement/types"/>
+    <ds:schemaRef ds:uri="http://schemas.microsoft.com/office/infopath/2007/PartnerControls"/>
+    <ds:schemaRef ds:uri="http://purl.org/dc/elements/1.1/"/>
+    <ds:schemaRef ds:uri="http://schemas.microsoft.com/office/2006/metadata/properties"/>
+    <ds:schemaRef ds:uri="40262f94-9f35-4ac3-9a90-690165a166b7"/>
+    <ds:schemaRef ds:uri="a4f35948-e619-41b3-aa29-22878b09cfd2"/>
+    <ds:schemaRef ds:uri="http://www.w3.org/XML/1998/namespace"/>
+    <ds:schemaRef ds:uri="http://purl.org/dc/dcmitype/"/>
   </ds:schemaRefs>
 </ds:datastoreItem>
 </file>
@@ -11388,18 +11763,9 @@
 </file>
 
 <file path=customXml/itemProps3.xml><?xml version="1.0" encoding="utf-8"?>
-<ds:datastoreItem xmlns:ds="http://schemas.openxmlformats.org/officeDocument/2006/customXml" ds:itemID="{5E700CCB-20BA-4760-AB9F-AC3B63ED32E0}">
+<ds:datastoreItem xmlns:ds="http://schemas.openxmlformats.org/officeDocument/2006/customXml" ds:itemID="{308942AA-0721-4324-BC2C-A3CB43F24E71}">
   <ds:schemaRefs>
-    <ds:schemaRef ds:uri="http://purl.org/dc/terms/"/>
-    <ds:schemaRef ds:uri="http://schemas.openxmlformats.org/package/2006/metadata/core-properties"/>
-    <ds:schemaRef ds:uri="http://schemas.microsoft.com/office/2006/documentManagement/types"/>
-    <ds:schemaRef ds:uri="http://schemas.microsoft.com/office/infopath/2007/PartnerControls"/>
-    <ds:schemaRef ds:uri="http://purl.org/dc/elements/1.1/"/>
-    <ds:schemaRef ds:uri="http://schemas.microsoft.com/office/2006/metadata/properties"/>
-    <ds:schemaRef ds:uri="40262f94-9f35-4ac3-9a90-690165a166b7"/>
-    <ds:schemaRef ds:uri="a4f35948-e619-41b3-aa29-22878b09cfd2"/>
-    <ds:schemaRef ds:uri="http://www.w3.org/XML/1998/namespace"/>
-    <ds:schemaRef ds:uri="http://purl.org/dc/dcmitype/"/>
+    <ds:schemaRef ds:uri="http://schemas.microsoft.com/sharepoint/v3/contenttype/forms"/>
   </ds:schemaRefs>
 </ds:datastoreItem>
 </file>
</xml_diff>